<commit_message>
Minor cosmetic changes done
</commit_message>
<xml_diff>
--- a/Presentations/Tracking.pptx
+++ b/Presentations/Tracking.pptx
@@ -2820,37 +2820,7 @@
               <a:rPr b="0" lang="en-IN" sz="4400" spc="-1" strike="noStrike">
                 <a:latin typeface="Arial"/>
               </a:rPr>
-              <a:t>Click </a:t>
-            </a:r>
-            <a:r>
-              <a:rPr b="0" lang="en-IN" sz="4400" spc="-1" strike="noStrike">
-                <a:latin typeface="Arial"/>
-              </a:rPr>
-              <a:t>to edit </a:t>
-            </a:r>
-            <a:r>
-              <a:rPr b="0" lang="en-IN" sz="4400" spc="-1" strike="noStrike">
-                <a:latin typeface="Arial"/>
-              </a:rPr>
-              <a:t>the </a:t>
-            </a:r>
-            <a:r>
-              <a:rPr b="0" lang="en-IN" sz="4400" spc="-1" strike="noStrike">
-                <a:latin typeface="Arial"/>
-              </a:rPr>
-              <a:t>title </a:t>
-            </a:r>
-            <a:r>
-              <a:rPr b="0" lang="en-IN" sz="4400" spc="-1" strike="noStrike">
-                <a:latin typeface="Arial"/>
-              </a:rPr>
-              <a:t>text </a:t>
-            </a:r>
-            <a:r>
-              <a:rPr b="0" lang="en-IN" sz="4400" spc="-1" strike="noStrike">
-                <a:latin typeface="Arial"/>
-              </a:rPr>
-              <a:t>format</a:t>
+              <a:t>Click to edit the title text format</a:t>
             </a:r>
             <a:endParaRPr b="0" lang="en-IN" sz="4400" spc="-1" strike="noStrike">
               <a:latin typeface="Arial"/>
@@ -3213,79 +3183,7 @@
               <a:rPr b="0" lang="en-IN" sz="4400" spc="-1" strike="noStrike">
                 <a:latin typeface="Arial"/>
               </a:rPr>
-              <a:t>Cli</a:t>
-            </a:r>
-            <a:r>
-              <a:rPr b="0" lang="en-IN" sz="4400" spc="-1" strike="noStrike">
-                <a:latin typeface="Arial"/>
-              </a:rPr>
-              <a:t>ck </a:t>
-            </a:r>
-            <a:r>
-              <a:rPr b="0" lang="en-IN" sz="4400" spc="-1" strike="noStrike">
-                <a:latin typeface="Arial"/>
-              </a:rPr>
-              <a:t>to </a:t>
-            </a:r>
-            <a:r>
-              <a:rPr b="0" lang="en-IN" sz="4400" spc="-1" strike="noStrike">
-                <a:latin typeface="Arial"/>
-              </a:rPr>
-              <a:t>edi</a:t>
-            </a:r>
-            <a:r>
-              <a:rPr b="0" lang="en-IN" sz="4400" spc="-1" strike="noStrike">
-                <a:latin typeface="Arial"/>
-              </a:rPr>
-              <a:t>t </a:t>
-            </a:r>
-            <a:r>
-              <a:rPr b="0" lang="en-IN" sz="4400" spc="-1" strike="noStrike">
-                <a:latin typeface="Arial"/>
-              </a:rPr>
-              <a:t>the </a:t>
-            </a:r>
-            <a:r>
-              <a:rPr b="0" lang="en-IN" sz="4400" spc="-1" strike="noStrike">
-                <a:latin typeface="Arial"/>
-              </a:rPr>
-              <a:t>titl</a:t>
-            </a:r>
-            <a:r>
-              <a:rPr b="0" lang="en-IN" sz="4400" spc="-1" strike="noStrike">
-                <a:latin typeface="Arial"/>
-              </a:rPr>
-              <a:t>e </a:t>
-            </a:r>
-            <a:r>
-              <a:rPr b="0" lang="en-IN" sz="4400" spc="-1" strike="noStrike">
-                <a:latin typeface="Arial"/>
-              </a:rPr>
-              <a:t>tex</a:t>
-            </a:r>
-            <a:r>
-              <a:rPr b="0" lang="en-IN" sz="4400" spc="-1" strike="noStrike">
-                <a:latin typeface="Arial"/>
-              </a:rPr>
-              <a:t>t </a:t>
-            </a:r>
-            <a:r>
-              <a:rPr b="0" lang="en-IN" sz="4400" spc="-1" strike="noStrike">
-                <a:latin typeface="Arial"/>
-              </a:rPr>
-              <a:t>for</a:t>
-            </a:r>
-            <a:r>
-              <a:rPr b="0" lang="en-IN" sz="4400" spc="-1" strike="noStrike">
-                <a:latin typeface="Arial"/>
-              </a:rPr>
-              <a:t>ma</a:t>
-            </a:r>
-            <a:r>
-              <a:rPr b="0" lang="en-IN" sz="4400" spc="-1" strike="noStrike">
-                <a:latin typeface="Arial"/>
-              </a:rPr>
-              <a:t>t</a:t>
+              <a:t>Click to edit the title text format</a:t>
             </a:r>
             <a:endParaRPr b="0" lang="en-IN" sz="4400" spc="-1" strike="noStrike">
               <a:latin typeface="Arial"/>
@@ -3517,8 +3415,8 @@
         </p:nvSpPr>
         <p:spPr>
           <a:xfrm>
-            <a:off x="360000" y="3330000"/>
-            <a:ext cx="9358920" cy="898920"/>
+            <a:off x="361080" y="3528000"/>
+            <a:ext cx="9358920" cy="556920"/>
           </a:xfrm>
           <a:prstGeom prst="rect">
             <a:avLst/>
@@ -3545,17 +3443,17 @@
               </a:lnSpc>
             </a:pPr>
             <a:r>
-              <a:rPr b="1" lang="en-IN" sz="2400" spc="-1" strike="noStrike">
+              <a:rPr b="1" lang="en-IN" sz="4400" spc="-1" strike="noStrike">
                 <a:solidFill>
                   <a:srgbClr val="ffffff"/>
                 </a:solidFill>
-                <a:latin typeface="Noto Sans Black"/>
+                <a:latin typeface="Times New Roman"/>
                 <a:ea typeface="DejaVu Sans"/>
               </a:rPr>
               <a:t>Tracking </a:t>
             </a:r>
-            <a:endParaRPr b="0" lang="en-IN" sz="2400" spc="-1" strike="noStrike">
-              <a:latin typeface="Arial"/>
+            <a:endParaRPr b="0" lang="en-IN" sz="4400" spc="-1" strike="noStrike">
+              <a:latin typeface="Times New Roman"/>
             </a:endParaRPr>
           </a:p>
         </p:txBody>
@@ -5292,12 +5190,98 @@
             <a:r>
               <a:rPr b="1" lang="en-IN" sz="2800" spc="-1" strike="noStrike">
                 <a:solidFill>
+                  <a:srgbClr val="000000"/>
+                </a:solidFill>
+                <a:latin typeface="Times New Roman"/>
+                <a:ea typeface="DejaVu Sans"/>
+              </a:rPr>
+              <a:t>Remember that you need to query </a:t>
+            </a:r>
+            <a:r>
+              <a:rPr b="1" lang="en-IN" sz="2800" spc="-1" strike="noStrike">
+                <a:solidFill>
+                  <a:srgbClr val="0000ff"/>
+                </a:solidFill>
+                <a:latin typeface="Times New Roman"/>
+                <a:ea typeface="DejaVu Sans"/>
+              </a:rPr>
+              <a:t>TrackingManager</a:t>
+            </a:r>
+            <a:r>
+              <a:rPr b="1" lang="en-IN" sz="2800" spc="-1" strike="noStrike">
+                <a:solidFill>
+                  <a:srgbClr val="000000"/>
+                </a:solidFill>
+                <a:latin typeface="Times New Roman"/>
+                <a:ea typeface="DejaVu Sans"/>
+              </a:rPr>
+              <a:t> object </a:t>
+            </a:r>
+            <a:r>
+              <a:rPr b="1" lang="en-IN" sz="2800" spc="-1" strike="noStrike">
+                <a:solidFill>
+                  <a:srgbClr val="0000ff"/>
+                </a:solidFill>
+                <a:latin typeface="Times New Roman"/>
+                <a:ea typeface="DejaVu Sans"/>
+              </a:rPr>
+              <a:t>fpTrackingManager</a:t>
+            </a:r>
+            <a:r>
+              <a:rPr b="1" lang="en-IN" sz="2800" spc="-1" strike="noStrike">
+                <a:solidFill>
+                  <a:srgbClr val="000000"/>
+                </a:solidFill>
+                <a:latin typeface="Times New Roman"/>
+                <a:ea typeface="DejaVu Sans"/>
+              </a:rPr>
+              <a:t> in order to get  the trajectory.</a:t>
+            </a:r>
+            <a:endParaRPr b="0" lang="en-IN" sz="2800" spc="-1" strike="noStrike">
+              <a:latin typeface="Arial"/>
+            </a:endParaRPr>
+          </a:p>
+          <a:p>
+            <a:pPr>
+              <a:lnSpc>
+                <a:spcPct val="100000"/>
+              </a:lnSpc>
+              <a:spcAft>
+                <a:spcPts val="1142"/>
+              </a:spcAft>
+            </a:pPr>
+            <a:r>
+              <a:rPr b="1" lang="en-IN" sz="2800" spc="-1" strike="noStrike">
+                <a:solidFill>
+                  <a:srgbClr val="000000"/>
+                </a:solidFill>
+                <a:latin typeface="Times New Roman"/>
+                <a:ea typeface="DejaVu Sans"/>
+              </a:rPr>
+              <a:t>Three important function related to TrackingManager</a:t>
+            </a:r>
+            <a:endParaRPr b="0" lang="en-IN" sz="2800" spc="-1" strike="noStrike">
+              <a:latin typeface="Arial"/>
+            </a:endParaRPr>
+          </a:p>
+          <a:p>
+            <a:pPr>
+              <a:lnSpc>
+                <a:spcPct val="100000"/>
+              </a:lnSpc>
+              <a:spcAft>
+                <a:spcPts val="1142"/>
+              </a:spcAft>
+            </a:pPr>
+            <a:r>
+              <a:rPr b="1" lang="en-IN" sz="2800" spc="-1" strike="noStrike">
+                <a:solidFill>
                   <a:srgbClr val="800080"/>
                 </a:solidFill>
                 <a:latin typeface="Times New Roman"/>
                 <a:ea typeface="DejaVu Sans"/>
               </a:rPr>
-              <a:t>Remember that you need to query TrackingManager object fpTrackingManager in order to get  the trajectory.</a:t>
+              <a:t>(1) GetStoreTrajectory() (2) SetStoreTrajectory()</a:t>
             </a:r>
             <a:endParaRPr b="0" lang="en-IN" sz="2800" spc="-1" strike="noStrike">
               <a:latin typeface="Arial"/>
@@ -5320,7 +5304,7 @@
                 <a:latin typeface="Times New Roman"/>
                 <a:ea typeface="DejaVu Sans"/>
               </a:rPr>
-              <a:t>Three important function related to TrackingManager</a:t>
+              <a:t>(3) GimmeTrajectory()</a:t>
             </a:r>
             <a:endParaRPr b="0" lang="en-IN" sz="2800" spc="-1" strike="noStrike">
               <a:latin typeface="Arial"/>
@@ -5335,6 +5319,19 @@
                 <a:spcPts val="1142"/>
               </a:spcAft>
             </a:pPr>
+            <a:endParaRPr b="0" lang="en-IN" sz="2800" spc="-1" strike="noStrike">
+              <a:latin typeface="Arial"/>
+            </a:endParaRPr>
+          </a:p>
+          <a:p>
+            <a:pPr>
+              <a:lnSpc>
+                <a:spcPct val="100000"/>
+              </a:lnSpc>
+              <a:spcAft>
+                <a:spcPts val="1142"/>
+              </a:spcAft>
+            </a:pPr>
             <a:r>
               <a:rPr b="1" lang="en-IN" sz="2800" spc="-1" strike="noStrike">
                 <a:solidFill>
@@ -5343,7 +5340,17 @@
                 <a:latin typeface="Times New Roman"/>
                 <a:ea typeface="DejaVu Sans"/>
               </a:rPr>
-              <a:t>(1) GetStoreTrajectory() (2) SetStoreTrajectory()</a:t>
+              <a:t>GetStoreTrajectory() </a:t>
+            </a:r>
+            <a:r>
+              <a:rPr b="1" lang="en-IN" sz="2800" spc="-1" strike="noStrike">
+                <a:solidFill>
+                  <a:srgbClr val="000000"/>
+                </a:solidFill>
+                <a:latin typeface="Times New Roman"/>
+                <a:ea typeface="DejaVu Sans"/>
+              </a:rPr>
+              <a:t>just tell whether the trajectory storage is enable or not.</a:t>
             </a:r>
             <a:endParaRPr b="0" lang="en-IN" sz="2800" spc="-1" strike="noStrike">
               <a:latin typeface="Arial"/>
@@ -5361,94 +5368,45 @@
             <a:r>
               <a:rPr b="1" lang="en-IN" sz="2800" spc="-1" strike="noStrike">
                 <a:solidFill>
+                  <a:srgbClr val="000000"/>
+                </a:solidFill>
+                <a:latin typeface="Times New Roman"/>
+                <a:ea typeface="DejaVu Sans"/>
+              </a:rPr>
+              <a:t>It does not give the Trajectory itself.</a:t>
+            </a:r>
+            <a:endParaRPr b="0" lang="en-IN" sz="2800" spc="-1" strike="noStrike">
+              <a:latin typeface="Arial"/>
+            </a:endParaRPr>
+          </a:p>
+          <a:p>
+            <a:pPr>
+              <a:lnSpc>
+                <a:spcPct val="100000"/>
+              </a:lnSpc>
+              <a:spcAft>
+                <a:spcPts val="1142"/>
+              </a:spcAft>
+            </a:pPr>
+            <a:r>
+              <a:rPr b="1" lang="en-IN" sz="2800" spc="-1" strike="noStrike">
+                <a:solidFill>
                   <a:srgbClr val="800080"/>
                 </a:solidFill>
                 <a:latin typeface="Times New Roman"/>
                 <a:ea typeface="DejaVu Sans"/>
               </a:rPr>
-              <a:t>(3) GimmeTrajectory()</a:t>
-            </a:r>
-            <a:endParaRPr b="0" lang="en-IN" sz="2800" spc="-1" strike="noStrike">
-              <a:latin typeface="Arial"/>
-            </a:endParaRPr>
-          </a:p>
-          <a:p>
-            <a:pPr>
-              <a:lnSpc>
-                <a:spcPct val="100000"/>
-              </a:lnSpc>
-              <a:spcAft>
-                <a:spcPts val="1142"/>
-              </a:spcAft>
-            </a:pPr>
-            <a:endParaRPr b="0" lang="en-IN" sz="2800" spc="-1" strike="noStrike">
-              <a:latin typeface="Arial"/>
-            </a:endParaRPr>
-          </a:p>
-          <a:p>
-            <a:pPr>
-              <a:lnSpc>
-                <a:spcPct val="100000"/>
-              </a:lnSpc>
-              <a:spcAft>
-                <a:spcPts val="1142"/>
-              </a:spcAft>
-            </a:pPr>
+              <a:t>GimmeTrajectory() </a:t>
+            </a:r>
             <a:r>
               <a:rPr b="1" lang="en-IN" sz="2800" spc="-1" strike="noStrike">
                 <a:solidFill>
-                  <a:srgbClr val="800080"/>
-                </a:solidFill>
-                <a:latin typeface="Times New Roman"/>
-                <a:ea typeface="DejaVu Sans"/>
-              </a:rPr>
-              <a:t>GetStoreTrajectory() just tell whether the trajectory storage is enable or not.</a:t>
-            </a:r>
-            <a:endParaRPr b="0" lang="en-IN" sz="2800" spc="-1" strike="noStrike">
-              <a:latin typeface="Arial"/>
-            </a:endParaRPr>
-          </a:p>
-          <a:p>
-            <a:pPr>
-              <a:lnSpc>
-                <a:spcPct val="100000"/>
-              </a:lnSpc>
-              <a:spcAft>
-                <a:spcPts val="1142"/>
-              </a:spcAft>
-            </a:pPr>
-            <a:r>
-              <a:rPr b="1" lang="en-IN" sz="2800" spc="-1" strike="noStrike">
-                <a:solidFill>
-                  <a:srgbClr val="800080"/>
-                </a:solidFill>
-                <a:latin typeface="Times New Roman"/>
-                <a:ea typeface="DejaVu Sans"/>
-              </a:rPr>
-              <a:t>It does not give the Trajectory itself.</a:t>
-            </a:r>
-            <a:endParaRPr b="0" lang="en-IN" sz="2800" spc="-1" strike="noStrike">
-              <a:latin typeface="Arial"/>
-            </a:endParaRPr>
-          </a:p>
-          <a:p>
-            <a:pPr>
-              <a:lnSpc>
-                <a:spcPct val="100000"/>
-              </a:lnSpc>
-              <a:spcAft>
-                <a:spcPts val="1142"/>
-              </a:spcAft>
-            </a:pPr>
-            <a:r>
-              <a:rPr b="1" lang="en-IN" sz="2800" spc="-1" strike="noStrike">
-                <a:solidFill>
-                  <a:srgbClr val="800080"/>
-                </a:solidFill>
-                <a:latin typeface="Times New Roman"/>
-                <a:ea typeface="DejaVu Sans"/>
-              </a:rPr>
-              <a:t>GimmeTrajectory() function actually gives you a trajectory only if trajectory storage flag is set.</a:t>
+                  <a:srgbClr val="000000"/>
+                </a:solidFill>
+                <a:latin typeface="Times New Roman"/>
+                <a:ea typeface="DejaVu Sans"/>
+              </a:rPr>
+              <a:t>function actually gives you a trajectory only if trajectory storage flag is set.</a:t>
             </a:r>
             <a:endParaRPr b="0" lang="en-IN" sz="2800" spc="-1" strike="noStrike">
               <a:latin typeface="Arial"/>
@@ -7115,7 +7073,7 @@
         </p:nvSpPr>
         <p:spPr>
           <a:xfrm>
-            <a:off x="360000" y="1980000"/>
+            <a:off x="360000" y="1620000"/>
             <a:ext cx="9178920" cy="4678920"/>
           </a:xfrm>
           <a:prstGeom prst="rect">
@@ -7176,6 +7134,16 @@
                 <a:latin typeface="Times New Roman"/>
                 <a:ea typeface="DejaVu Sans"/>
               </a:rPr>
+              <a:t>	</a:t>
+            </a:r>
+            <a:r>
+              <a:rPr b="1" lang="en-IN" sz="1950" spc="-1" strike="noStrike">
+                <a:solidFill>
+                  <a:srgbClr val="1c1c1c"/>
+                </a:solidFill>
+                <a:latin typeface="Times New Roman"/>
+                <a:ea typeface="DejaVu Sans"/>
+              </a:rPr>
               <a:t>Particle Type</a:t>
             </a:r>
             <a:endParaRPr b="0" lang="en-IN" sz="1950" spc="-1" strike="noStrike">
@@ -7199,6 +7167,16 @@
                 <a:latin typeface="Times New Roman"/>
                 <a:ea typeface="DejaVu Sans"/>
               </a:rPr>
+              <a:t>	</a:t>
+            </a:r>
+            <a:r>
+              <a:rPr b="1" lang="en-IN" sz="1950" spc="-1" strike="noStrike">
+                <a:solidFill>
+                  <a:srgbClr val="1c1c1c"/>
+                </a:solidFill>
+                <a:latin typeface="Times New Roman"/>
+                <a:ea typeface="DejaVu Sans"/>
+              </a:rPr>
               <a:t>Physics Process</a:t>
             </a:r>
             <a:endParaRPr b="0" lang="en-IN" sz="1950" spc="-1" strike="noStrike">
@@ -7245,6 +7223,16 @@
                 <a:latin typeface="Times New Roman"/>
                 <a:ea typeface="DejaVu Sans"/>
               </a:rPr>
+              <a:t>	</a:t>
+            </a:r>
+            <a:r>
+              <a:rPr b="1" lang="en-IN" sz="1950" spc="-1" strike="noStrike">
+                <a:solidFill>
+                  <a:srgbClr val="1c1c1c"/>
+                </a:solidFill>
+                <a:latin typeface="Times New Roman"/>
+                <a:ea typeface="DejaVu Sans"/>
+              </a:rPr>
               <a:t>Determining the step length</a:t>
             </a:r>
             <a:endParaRPr b="0" lang="en-IN" sz="1950" spc="-1" strike="noStrike">
@@ -7268,6 +7256,16 @@
                 <a:latin typeface="Times New Roman"/>
                 <a:ea typeface="DejaVu Sans"/>
               </a:rPr>
+              <a:t>	</a:t>
+            </a:r>
+            <a:r>
+              <a:rPr b="1" lang="en-IN" sz="1950" spc="-1" strike="noStrike">
+                <a:solidFill>
+                  <a:srgbClr val="1c1c1c"/>
+                </a:solidFill>
+                <a:latin typeface="Times New Roman"/>
+                <a:ea typeface="DejaVu Sans"/>
+              </a:rPr>
               <a:t>Generate secondary particles</a:t>
             </a:r>
             <a:endParaRPr b="0" lang="en-IN" sz="1950" spc="-1" strike="noStrike">
@@ -7283,6 +7281,16 @@
                 <a:spcPts val="853"/>
               </a:spcAft>
             </a:pPr>
+            <a:r>
+              <a:rPr b="1" lang="en-IN" sz="1950" spc="-1" strike="noStrike">
+                <a:solidFill>
+                  <a:srgbClr val="1c1c1c"/>
+                </a:solidFill>
+                <a:latin typeface="Times New Roman"/>
+                <a:ea typeface="DejaVu Sans"/>
+              </a:rPr>
+              <a:t>	</a:t>
+            </a:r>
             <a:r>
               <a:rPr b="1" lang="en-IN" sz="1950" spc="-1" strike="noStrike">
                 <a:solidFill>
@@ -7983,7 +7991,16 @@
                 </a:solidFill>
                 <a:latin typeface="Calibri"/>
               </a:rPr>
-              <a:t>Tracking follows particles from creation to termination step-by-step.</a:t>
+              <a:t>Tracking follows particles from creation to </a:t>
+            </a:r>
+            <a:r>
+              <a:rPr b="0" lang="en-IN" sz="3200" spc="-1" strike="noStrike">
+                <a:solidFill>
+                  <a:srgbClr val="000000"/>
+                </a:solidFill>
+                <a:latin typeface="Calibri"/>
+              </a:rPr>
+              <a:t>termination step-by-step.</a:t>
             </a:r>
             <a:endParaRPr b="0" lang="en-IN" sz="3200" spc="-1" strike="noStrike">
               <a:latin typeface="Arial"/>
@@ -8010,7 +8027,16 @@
                 </a:solidFill>
                 <a:latin typeface="Calibri"/>
               </a:rPr>
-              <a:t>- Includes interactions, decays, and field effects.</a:t>
+              <a:t>- Includes interactions, decays, and field </a:t>
+            </a:r>
+            <a:r>
+              <a:rPr b="0" lang="en-IN" sz="3200" spc="-1" strike="noStrike">
+                <a:solidFill>
+                  <a:srgbClr val="000000"/>
+                </a:solidFill>
+                <a:latin typeface="Calibri"/>
+              </a:rPr>
+              <a:t>effects.</a:t>
             </a:r>
             <a:endParaRPr b="0" lang="en-IN" sz="3200" spc="-1" strike="noStrike">
               <a:latin typeface="Arial"/>
@@ -8037,7 +8063,16 @@
                 </a:solidFill>
                 <a:latin typeface="Calibri"/>
               </a:rPr>
-              <a:t>- Each step contributes to simulation accuracy.</a:t>
+              <a:t>- Each step contributes to simulation </a:t>
+            </a:r>
+            <a:r>
+              <a:rPr b="0" lang="en-IN" sz="3200" spc="-1" strike="noStrike">
+                <a:solidFill>
+                  <a:srgbClr val="000000"/>
+                </a:solidFill>
+                <a:latin typeface="Calibri"/>
+              </a:rPr>
+              <a:t>accuracy.</a:t>
             </a:r>
             <a:endParaRPr b="0" lang="en-IN" sz="3200" spc="-1" strike="noStrike">
               <a:latin typeface="Arial"/>

</xml_diff>